<commit_message>
fifth storage and simulator diagnosis
</commit_message>
<xml_diff>
--- a/reference/network_chart.pptx
+++ b/reference/network_chart.pptx
@@ -104,6 +104,11 @@
       </a:defRPr>
     </a:lvl9pPr>
   </p:defaultTextStyle>
+  <p:extLst>
+    <p:ext uri="{EFAFB233-063F-42B5-8137-9DF3F51BA10A}">
+      <p15:sldGuideLst xmlns:p15="http://schemas.microsoft.com/office/powerpoint/2012/main"/>
+    </p:ext>
+  </p:extLst>
 </p:presentation>
 </file>
 
@@ -238,7 +243,7 @@
           <a:p>
             <a:fld id="{B56066BE-FE7E-6E4C-A983-50FB203C43C2}" type="datetimeFigureOut">
               <a:rPr lang="en-US" smtClean="0"/>
-              <a:t>11/29/15</a:t>
+              <a:t>12/14/15</a:t>
             </a:fld>
             <a:endParaRPr lang="en-US"/>
           </a:p>
@@ -408,7 +413,7 @@
           <a:p>
             <a:fld id="{B56066BE-FE7E-6E4C-A983-50FB203C43C2}" type="datetimeFigureOut">
               <a:rPr lang="en-US" smtClean="0"/>
-              <a:t>11/29/15</a:t>
+              <a:t>12/14/15</a:t>
             </a:fld>
             <a:endParaRPr lang="en-US"/>
           </a:p>
@@ -588,7 +593,7 @@
           <a:p>
             <a:fld id="{B56066BE-FE7E-6E4C-A983-50FB203C43C2}" type="datetimeFigureOut">
               <a:rPr lang="en-US" smtClean="0"/>
-              <a:t>11/29/15</a:t>
+              <a:t>12/14/15</a:t>
             </a:fld>
             <a:endParaRPr lang="en-US"/>
           </a:p>
@@ -758,7 +763,7 @@
           <a:p>
             <a:fld id="{B56066BE-FE7E-6E4C-A983-50FB203C43C2}" type="datetimeFigureOut">
               <a:rPr lang="en-US" smtClean="0"/>
-              <a:t>11/29/15</a:t>
+              <a:t>12/14/15</a:t>
             </a:fld>
             <a:endParaRPr lang="en-US"/>
           </a:p>
@@ -1004,7 +1009,7 @@
           <a:p>
             <a:fld id="{B56066BE-FE7E-6E4C-A983-50FB203C43C2}" type="datetimeFigureOut">
               <a:rPr lang="en-US" smtClean="0"/>
-              <a:t>11/29/15</a:t>
+              <a:t>12/14/15</a:t>
             </a:fld>
             <a:endParaRPr lang="en-US"/>
           </a:p>
@@ -1236,7 +1241,7 @@
           <a:p>
             <a:fld id="{B56066BE-FE7E-6E4C-A983-50FB203C43C2}" type="datetimeFigureOut">
               <a:rPr lang="en-US" smtClean="0"/>
-              <a:t>11/29/15</a:t>
+              <a:t>12/14/15</a:t>
             </a:fld>
             <a:endParaRPr lang="en-US"/>
           </a:p>
@@ -1603,7 +1608,7 @@
           <a:p>
             <a:fld id="{B56066BE-FE7E-6E4C-A983-50FB203C43C2}" type="datetimeFigureOut">
               <a:rPr lang="en-US" smtClean="0"/>
-              <a:t>11/29/15</a:t>
+              <a:t>12/14/15</a:t>
             </a:fld>
             <a:endParaRPr lang="en-US"/>
           </a:p>
@@ -1721,7 +1726,7 @@
           <a:p>
             <a:fld id="{B56066BE-FE7E-6E4C-A983-50FB203C43C2}" type="datetimeFigureOut">
               <a:rPr lang="en-US" smtClean="0"/>
-              <a:t>11/29/15</a:t>
+              <a:t>12/14/15</a:t>
             </a:fld>
             <a:endParaRPr lang="en-US"/>
           </a:p>
@@ -1816,7 +1821,7 @@
           <a:p>
             <a:fld id="{B56066BE-FE7E-6E4C-A983-50FB203C43C2}" type="datetimeFigureOut">
               <a:rPr lang="en-US" smtClean="0"/>
-              <a:t>11/29/15</a:t>
+              <a:t>12/14/15</a:t>
             </a:fld>
             <a:endParaRPr lang="en-US"/>
           </a:p>
@@ -2093,7 +2098,7 @@
           <a:p>
             <a:fld id="{B56066BE-FE7E-6E4C-A983-50FB203C43C2}" type="datetimeFigureOut">
               <a:rPr lang="en-US" smtClean="0"/>
-              <a:t>11/29/15</a:t>
+              <a:t>12/14/15</a:t>
             </a:fld>
             <a:endParaRPr lang="en-US"/>
           </a:p>
@@ -2346,7 +2351,7 @@
           <a:p>
             <a:fld id="{B56066BE-FE7E-6E4C-A983-50FB203C43C2}" type="datetimeFigureOut">
               <a:rPr lang="en-US" smtClean="0"/>
-              <a:t>11/29/15</a:t>
+              <a:t>12/14/15</a:t>
             </a:fld>
             <a:endParaRPr lang="en-US"/>
           </a:p>
@@ -2559,7 +2564,7 @@
           <a:p>
             <a:fld id="{B56066BE-FE7E-6E4C-A983-50FB203C43C2}" type="datetimeFigureOut">
               <a:rPr lang="en-US" smtClean="0"/>
-              <a:t>11/29/15</a:t>
+              <a:t>12/14/15</a:t>
             </a:fld>
             <a:endParaRPr lang="en-US"/>
           </a:p>
@@ -4126,15 +4131,15 @@
         <p:nvCxnSpPr>
           <p:cNvPr id="58" name="Straight Arrow Connector 57"/>
           <p:cNvCxnSpPr>
-            <a:stCxn id="15" idx="2"/>
+            <a:stCxn id="44" idx="2"/>
             <a:endCxn id="49" idx="0"/>
           </p:cNvCxnSpPr>
           <p:nvPr/>
         </p:nvCxnSpPr>
         <p:spPr>
-          <a:xfrm flipH="1">
-            <a:off x="4384657" y="5888134"/>
-            <a:ext cx="1045780" cy="318783"/>
+          <a:xfrm>
+            <a:off x="4384657" y="5888133"/>
+            <a:ext cx="0" cy="318784"/>
           </a:xfrm>
           <a:prstGeom prst="straightConnector1">
             <a:avLst/>
@@ -4477,6 +4482,117 @@
           </a:p>
         </p:txBody>
       </p:sp>
+      <p:sp>
+        <p:nvSpPr>
+          <p:cNvPr id="44" name="TextBox 43"/>
+          <p:cNvSpPr txBox="1"/>
+          <p:nvPr/>
+        </p:nvSpPr>
+        <p:spPr>
+          <a:xfrm>
+            <a:off x="4087774" y="5518801"/>
+            <a:ext cx="593765" cy="369332"/>
+          </a:xfrm>
+          <a:prstGeom prst="rect">
+            <a:avLst/>
+          </a:prstGeom>
+          <a:noFill/>
+          <a:ln>
+            <a:solidFill>
+              <a:schemeClr val="tx1"/>
+            </a:solidFill>
+          </a:ln>
+        </p:spPr>
+        <p:txBody>
+          <a:bodyPr wrap="square" rtlCol="0">
+            <a:spAutoFit/>
+          </a:bodyPr>
+          <a:lstStyle/>
+          <a:p>
+            <a:pPr algn="ctr"/>
+            <a:r>
+              <a:rPr lang="en-US" dirty="0" smtClean="0"/>
+              <a:t>S21</a:t>
+            </a:r>
+            <a:endParaRPr lang="en-US" dirty="0"/>
+          </a:p>
+        </p:txBody>
+      </p:sp>
+      <p:cxnSp>
+        <p:nvCxnSpPr>
+          <p:cNvPr id="56" name="Straight Arrow Connector 55"/>
+          <p:cNvCxnSpPr>
+            <a:stCxn id="10" idx="2"/>
+            <a:endCxn id="44" idx="0"/>
+          </p:cNvCxnSpPr>
+          <p:nvPr/>
+        </p:nvCxnSpPr>
+        <p:spPr>
+          <a:xfrm flipH="1">
+            <a:off x="4384657" y="1268239"/>
+            <a:ext cx="1045781" cy="4250562"/>
+          </a:xfrm>
+          <a:prstGeom prst="straightConnector1">
+            <a:avLst/>
+          </a:prstGeom>
+          <a:ln w="25400" cap="flat">
+            <a:solidFill>
+              <a:srgbClr val="92D050"/>
+            </a:solidFill>
+            <a:tailEnd type="triangle" w="lg" len="lg"/>
+          </a:ln>
+        </p:spPr>
+        <p:style>
+          <a:lnRef idx="1">
+            <a:schemeClr val="accent1"/>
+          </a:lnRef>
+          <a:fillRef idx="0">
+            <a:schemeClr val="accent1"/>
+          </a:fillRef>
+          <a:effectRef idx="0">
+            <a:schemeClr val="accent1"/>
+          </a:effectRef>
+          <a:fontRef idx="minor">
+            <a:schemeClr val="tx1"/>
+          </a:fontRef>
+        </p:style>
+      </p:cxnSp>
+      <p:cxnSp>
+        <p:nvCxnSpPr>
+          <p:cNvPr id="57" name="Straight Arrow Connector 56"/>
+          <p:cNvCxnSpPr>
+            <a:stCxn id="4" idx="3"/>
+            <a:endCxn id="44" idx="0"/>
+          </p:cNvCxnSpPr>
+          <p:nvPr/>
+        </p:nvCxnSpPr>
+        <p:spPr>
+          <a:xfrm>
+            <a:off x="1638795" y="1740333"/>
+            <a:ext cx="2745862" cy="3778468"/>
+          </a:xfrm>
+          <a:prstGeom prst="straightConnector1">
+            <a:avLst/>
+          </a:prstGeom>
+          <a:ln w="25400" cap="flat">
+            <a:tailEnd type="triangle" w="lg" len="lg"/>
+          </a:ln>
+        </p:spPr>
+        <p:style>
+          <a:lnRef idx="1">
+            <a:schemeClr val="accent1"/>
+          </a:lnRef>
+          <a:fillRef idx="0">
+            <a:schemeClr val="accent1"/>
+          </a:fillRef>
+          <a:effectRef idx="0">
+            <a:schemeClr val="accent1"/>
+          </a:effectRef>
+          <a:fontRef idx="minor">
+            <a:schemeClr val="tx1"/>
+          </a:fontRef>
+        </p:style>
+      </p:cxnSp>
     </p:spTree>
     <p:extLst>
       <p:ext uri="{BB962C8B-B14F-4D97-AF65-F5344CB8AC3E}">

</xml_diff>